<commit_message>
added js instructory code
</commit_message>
<xml_diff>
--- a/react_nov28/main.pptx
+++ b/react_nov28/main.pptx
@@ -5,10 +5,10 @@
     <p:sldMasterId id="2147483678" r:id="rId1"/>
   </p:sldMasterIdLst>
   <p:notesMasterIdLst>
-    <p:notesMasterId r:id="rId25"/>
+    <p:notesMasterId r:id="rId26"/>
   </p:notesMasterIdLst>
   <p:handoutMasterIdLst>
-    <p:handoutMasterId r:id="rId26"/>
+    <p:handoutMasterId r:id="rId27"/>
   </p:handoutMasterIdLst>
   <p:sldIdLst>
     <p:sldId id="256" r:id="rId2"/>
@@ -23,17 +23,18 @@
     <p:sldId id="265" r:id="rId11"/>
     <p:sldId id="266" r:id="rId12"/>
     <p:sldId id="267" r:id="rId13"/>
-    <p:sldId id="268" r:id="rId14"/>
-    <p:sldId id="269" r:id="rId15"/>
-    <p:sldId id="270" r:id="rId16"/>
-    <p:sldId id="271" r:id="rId17"/>
-    <p:sldId id="272" r:id="rId18"/>
-    <p:sldId id="273" r:id="rId19"/>
-    <p:sldId id="274" r:id="rId20"/>
-    <p:sldId id="275" r:id="rId21"/>
-    <p:sldId id="277" r:id="rId22"/>
-    <p:sldId id="280" r:id="rId23"/>
-    <p:sldId id="278" r:id="rId24"/>
+    <p:sldId id="281" r:id="rId14"/>
+    <p:sldId id="268" r:id="rId15"/>
+    <p:sldId id="269" r:id="rId16"/>
+    <p:sldId id="270" r:id="rId17"/>
+    <p:sldId id="271" r:id="rId18"/>
+    <p:sldId id="272" r:id="rId19"/>
+    <p:sldId id="273" r:id="rId20"/>
+    <p:sldId id="274" r:id="rId21"/>
+    <p:sldId id="275" r:id="rId22"/>
+    <p:sldId id="277" r:id="rId23"/>
+    <p:sldId id="280" r:id="rId24"/>
+    <p:sldId id="278" r:id="rId25"/>
   </p:sldIdLst>
   <p:sldSz cx="12192000" cy="6858000"/>
   <p:notesSz cx="6858000" cy="9144000"/>
@@ -234,7 +235,7 @@
           <a:p>
             <a:fld id="{95E83527-387E-44EC-80D0-54B78E337621}" type="datetimeFigureOut">
               <a:rPr lang="en-US" smtClean="0"/>
-              <a:t>11/25/2022</a:t>
+              <a:t>11/28/2022</a:t>
             </a:fld>
             <a:endParaRPr lang="en-US"/>
           </a:p>
@@ -1367,7 +1368,7 @@
           <a:p>
             <a:fld id="{E017BD4A-E429-4FDE-A2F9-ECC650C85CD3}" type="datetimeFigureOut">
               <a:rPr lang="en-US" smtClean="0"/>
-              <a:t>11/25/2022</a:t>
+              <a:t>11/28/2022</a:t>
             </a:fld>
             <a:endParaRPr lang="en-US"/>
           </a:p>
@@ -1638,6 +1639,238 @@
 </p:notesMaster>
 </file>
 
+<file path=ppt/notesSlides/notesSlide1.xml><?xml version="1.0" encoding="utf-8"?>
+<p:notes xmlns:a="http://schemas.openxmlformats.org/drawingml/2006/main" xmlns:r="http://schemas.openxmlformats.org/officeDocument/2006/relationships" xmlns:p="http://schemas.openxmlformats.org/presentationml/2006/main">
+  <p:cSld>
+    <p:spTree>
+      <p:nvGrpSpPr>
+        <p:cNvPr id="1" name=""/>
+        <p:cNvGrpSpPr/>
+        <p:nvPr/>
+      </p:nvGrpSpPr>
+      <p:grpSpPr>
+        <a:xfrm>
+          <a:off x="0" y="0"/>
+          <a:ext cx="0" cy="0"/>
+          <a:chOff x="0" y="0"/>
+          <a:chExt cx="0" cy="0"/>
+        </a:xfrm>
+      </p:grpSpPr>
+      <p:sp>
+        <p:nvSpPr>
+          <p:cNvPr id="2" name="Slide Image Placeholder 1"/>
+          <p:cNvSpPr>
+            <a:spLocks noGrp="1" noRot="1" noChangeAspect="1"/>
+          </p:cNvSpPr>
+          <p:nvPr>
+            <p:ph type="sldImg"/>
+          </p:nvPr>
+        </p:nvSpPr>
+        <p:spPr/>
+      </p:sp>
+      <p:sp>
+        <p:nvSpPr>
+          <p:cNvPr id="3" name="Notes Placeholder 2"/>
+          <p:cNvSpPr>
+            <a:spLocks noGrp="1"/>
+          </p:cNvSpPr>
+          <p:nvPr>
+            <p:ph type="body" idx="1"/>
+          </p:nvPr>
+        </p:nvSpPr>
+        <p:spPr/>
+        <p:txBody>
+          <a:bodyPr/>
+          <a:lstStyle/>
+          <a:p>
+            <a:endParaRPr lang="en-US" dirty="0"/>
+          </a:p>
+        </p:txBody>
+      </p:sp>
+      <p:sp>
+        <p:nvSpPr>
+          <p:cNvPr id="4" name="Footer Placeholder 3"/>
+          <p:cNvSpPr>
+            <a:spLocks noGrp="1"/>
+          </p:cNvSpPr>
+          <p:nvPr>
+            <p:ph type="ftr" sz="quarter" idx="4"/>
+          </p:nvPr>
+        </p:nvSpPr>
+        <p:spPr/>
+        <p:txBody>
+          <a:bodyPr/>
+          <a:lstStyle/>
+          <a:p>
+            <a:r>
+              <a:rPr lang="en-US"/>
+              <a:t>Compiled by Zavaar Shah – https://github.com/thatziv</a:t>
+            </a:r>
+          </a:p>
+        </p:txBody>
+      </p:sp>
+      <p:sp>
+        <p:nvSpPr>
+          <p:cNvPr id="5" name="Slide Number Placeholder 4"/>
+          <p:cNvSpPr>
+            <a:spLocks noGrp="1"/>
+          </p:cNvSpPr>
+          <p:nvPr>
+            <p:ph type="sldNum" sz="quarter" idx="5"/>
+          </p:nvPr>
+        </p:nvSpPr>
+        <p:spPr/>
+        <p:txBody>
+          <a:bodyPr/>
+          <a:lstStyle/>
+          <a:p>
+            <a:fld id="{7A57AAD6-7DB9-4DBD-9E6C-8292364B7FB6}" type="slidenum">
+              <a:rPr lang="en-US" smtClean="0"/>
+              <a:t>14</a:t>
+            </a:fld>
+            <a:endParaRPr lang="en-US"/>
+          </a:p>
+        </p:txBody>
+      </p:sp>
+    </p:spTree>
+    <p:extLst>
+      <p:ext uri="{BB962C8B-B14F-4D97-AF65-F5344CB8AC3E}">
+        <p14:creationId xmlns:p14="http://schemas.microsoft.com/office/powerpoint/2010/main" val="4013900783"/>
+      </p:ext>
+    </p:extLst>
+  </p:cSld>
+  <p:clrMapOvr>
+    <a:masterClrMapping/>
+  </p:clrMapOvr>
+</p:notes>
+</file>
+
+<file path=ppt/notesSlides/notesSlide2.xml><?xml version="1.0" encoding="utf-8"?>
+<p:notes xmlns:a="http://schemas.openxmlformats.org/drawingml/2006/main" xmlns:r="http://schemas.openxmlformats.org/officeDocument/2006/relationships" xmlns:p="http://schemas.openxmlformats.org/presentationml/2006/main">
+  <p:cSld>
+    <p:spTree>
+      <p:nvGrpSpPr>
+        <p:cNvPr id="1" name=""/>
+        <p:cNvGrpSpPr/>
+        <p:nvPr/>
+      </p:nvGrpSpPr>
+      <p:grpSpPr>
+        <a:xfrm>
+          <a:off x="0" y="0"/>
+          <a:ext cx="0" cy="0"/>
+          <a:chOff x="0" y="0"/>
+          <a:chExt cx="0" cy="0"/>
+        </a:xfrm>
+      </p:grpSpPr>
+      <p:sp>
+        <p:nvSpPr>
+          <p:cNvPr id="2" name="Slide Image Placeholder 1"/>
+          <p:cNvSpPr>
+            <a:spLocks noGrp="1" noRot="1" noChangeAspect="1"/>
+          </p:cNvSpPr>
+          <p:nvPr>
+            <p:ph type="sldImg"/>
+          </p:nvPr>
+        </p:nvSpPr>
+        <p:spPr/>
+      </p:sp>
+      <p:sp>
+        <p:nvSpPr>
+          <p:cNvPr id="3" name="Notes Placeholder 2"/>
+          <p:cNvSpPr>
+            <a:spLocks noGrp="1"/>
+          </p:cNvSpPr>
+          <p:nvPr>
+            <p:ph type="body" idx="1"/>
+          </p:nvPr>
+        </p:nvSpPr>
+        <p:spPr/>
+        <p:txBody>
+          <a:bodyPr/>
+          <a:lstStyle/>
+          <a:p>
+            <a:r>
+              <a:rPr lang="en-US" dirty="0"/>
+              <a:t>Additional Topics: </a:t>
+            </a:r>
+          </a:p>
+          <a:p>
+            <a:pPr marL="171450" indent="-171450">
+              <a:buFont typeface="Arial" panose="020B0604020202020204" pitchFamily="34" charset="0"/>
+              <a:buChar char="•"/>
+            </a:pPr>
+            <a:r>
+              <a:rPr lang="en-US" dirty="0"/>
+              <a:t>Deployment &amp; Building</a:t>
+            </a:r>
+          </a:p>
+          <a:p>
+            <a:pPr marL="171450" indent="-171450">
+              <a:buFont typeface="Arial" panose="020B0604020202020204" pitchFamily="34" charset="0"/>
+              <a:buChar char="•"/>
+            </a:pPr>
+            <a:endParaRPr lang="en-US" dirty="0"/>
+          </a:p>
+        </p:txBody>
+      </p:sp>
+      <p:sp>
+        <p:nvSpPr>
+          <p:cNvPr id="4" name="Footer Placeholder 3"/>
+          <p:cNvSpPr>
+            <a:spLocks noGrp="1"/>
+          </p:cNvSpPr>
+          <p:nvPr>
+            <p:ph type="ftr" sz="quarter" idx="4"/>
+          </p:nvPr>
+        </p:nvSpPr>
+        <p:spPr/>
+        <p:txBody>
+          <a:bodyPr/>
+          <a:lstStyle/>
+          <a:p>
+            <a:r>
+              <a:rPr lang="en-US"/>
+              <a:t>Compiled by Zavaar Shah – https://github.com/thatziv</a:t>
+            </a:r>
+          </a:p>
+        </p:txBody>
+      </p:sp>
+      <p:sp>
+        <p:nvSpPr>
+          <p:cNvPr id="5" name="Slide Number Placeholder 4"/>
+          <p:cNvSpPr>
+            <a:spLocks noGrp="1"/>
+          </p:cNvSpPr>
+          <p:nvPr>
+            <p:ph type="sldNum" sz="quarter" idx="5"/>
+          </p:nvPr>
+        </p:nvSpPr>
+        <p:spPr/>
+        <p:txBody>
+          <a:bodyPr/>
+          <a:lstStyle/>
+          <a:p>
+            <a:fld id="{7A57AAD6-7DB9-4DBD-9E6C-8292364B7FB6}" type="slidenum">
+              <a:rPr lang="en-US" smtClean="0"/>
+              <a:t>24</a:t>
+            </a:fld>
+            <a:endParaRPr lang="en-US"/>
+          </a:p>
+        </p:txBody>
+      </p:sp>
+    </p:spTree>
+    <p:extLst>
+      <p:ext uri="{BB962C8B-B14F-4D97-AF65-F5344CB8AC3E}">
+        <p14:creationId xmlns:p14="http://schemas.microsoft.com/office/powerpoint/2010/main" val="2880252083"/>
+      </p:ext>
+    </p:extLst>
+  </p:cSld>
+  <p:clrMapOvr>
+    <a:masterClrMapping/>
+  </p:clrMapOvr>
+</p:notes>
+</file>
+
 <file path=ppt/slideLayouts/slideLayout1.xml><?xml version="1.0" encoding="utf-8"?>
 <p:sldLayout xmlns:a="http://schemas.openxmlformats.org/drawingml/2006/main" xmlns:r="http://schemas.openxmlformats.org/officeDocument/2006/relationships" xmlns:p="http://schemas.openxmlformats.org/presentationml/2006/main" type="title" preserve="1">
   <p:cSld name="Title Slide">
@@ -1824,7 +2057,7 @@
           <a:p>
             <a:fld id="{3087FCFC-493E-4E78-A2A8-0B058DAD110A}" type="datetime1">
               <a:rPr lang="en-US" smtClean="0"/>
-              <a:t>11/25/2022</a:t>
+              <a:t>11/28/2022</a:t>
             </a:fld>
             <a:endParaRPr lang="en-US"/>
           </a:p>
@@ -2102,7 +2335,7 @@
           <a:p>
             <a:fld id="{702F774C-1D73-4CA7-95BF-FA2683012EC0}" type="datetime1">
               <a:rPr lang="en-US" smtClean="0"/>
-              <a:t>11/25/2022</a:t>
+              <a:t>11/28/2022</a:t>
             </a:fld>
             <a:endParaRPr lang="en-US"/>
           </a:p>
@@ -2299,7 +2532,7 @@
           <a:p>
             <a:fld id="{5D27F58F-635E-437E-ABD8-FA77FB1E4A58}" type="datetime1">
               <a:rPr lang="en-US" smtClean="0"/>
-              <a:t>11/25/2022</a:t>
+              <a:t>11/28/2022</a:t>
             </a:fld>
             <a:endParaRPr lang="en-US"/>
           </a:p>
@@ -2575,7 +2808,7 @@
           <a:p>
             <a:fld id="{94B5B016-0EEA-419F-B2F7-9638C2237351}" type="datetime1">
               <a:rPr lang="en-US" smtClean="0"/>
-              <a:t>11/25/2022</a:t>
+              <a:t>11/28/2022</a:t>
             </a:fld>
             <a:endParaRPr lang="en-US"/>
           </a:p>
@@ -2919,7 +3152,7 @@
           <a:p>
             <a:fld id="{45E55CA7-873B-4C28-9D09-6E3ECE426769}" type="datetime1">
               <a:rPr lang="en-US" smtClean="0"/>
-              <a:t>11/25/2022</a:t>
+              <a:t>11/28/2022</a:t>
             </a:fld>
             <a:endParaRPr lang="en-US"/>
           </a:p>
@@ -3545,7 +3778,7 @@
           <a:p>
             <a:fld id="{988F7E35-32DA-4C0E-B856-E9C55BFD6D0C}" type="datetime1">
               <a:rPr lang="en-US" smtClean="0"/>
-              <a:t>11/25/2022</a:t>
+              <a:t>11/28/2022</a:t>
             </a:fld>
             <a:endParaRPr lang="en-US"/>
           </a:p>
@@ -4408,7 +4641,7 @@
           <a:p>
             <a:fld id="{3705401D-93E1-43B3-B200-3885AB16323C}" type="datetime1">
               <a:rPr lang="en-US" smtClean="0"/>
-              <a:t>11/25/2022</a:t>
+              <a:t>11/28/2022</a:t>
             </a:fld>
             <a:endParaRPr lang="en-US"/>
           </a:p>
@@ -4581,7 +4814,7 @@
           <a:p>
             <a:fld id="{25E185CD-A91F-463F-AC70-361831EAE071}" type="datetime1">
               <a:rPr lang="en-US" smtClean="0"/>
-              <a:t>11/25/2022</a:t>
+              <a:t>11/28/2022</a:t>
             </a:fld>
             <a:endParaRPr lang="en-US"/>
           </a:p>
@@ -4764,7 +4997,7 @@
           <a:p>
             <a:fld id="{1B61CCDB-4CA5-4F15-9BFC-2622702FD18C}" type="datetime1">
               <a:rPr lang="en-US" smtClean="0"/>
-              <a:t>11/25/2022</a:t>
+              <a:t>11/28/2022</a:t>
             </a:fld>
             <a:endParaRPr lang="en-US"/>
           </a:p>
@@ -4937,7 +5170,7 @@
           <a:p>
             <a:fld id="{8ECFEA56-C7C0-4E35-AD97-14C7551987BD}" type="datetime1">
               <a:rPr lang="en-US" smtClean="0"/>
-              <a:t>11/25/2022</a:t>
+              <a:t>11/28/2022</a:t>
             </a:fld>
             <a:endParaRPr lang="en-US"/>
           </a:p>
@@ -5187,7 +5420,7 @@
           <a:p>
             <a:fld id="{23B1865D-FEB9-455D-B877-EB71374E3427}" type="datetime1">
               <a:rPr lang="en-US" smtClean="0"/>
-              <a:t>11/25/2022</a:t>
+              <a:t>11/28/2022</a:t>
             </a:fld>
             <a:endParaRPr lang="en-US"/>
           </a:p>
@@ -5482,7 +5715,7 @@
           <a:p>
             <a:fld id="{6197806B-E1C1-4E3B-A9AE-1669D97261F3}" type="datetime1">
               <a:rPr lang="en-US" smtClean="0"/>
-              <a:t>11/25/2022</a:t>
+              <a:t>11/28/2022</a:t>
             </a:fld>
             <a:endParaRPr lang="en-US"/>
           </a:p>
@@ -5929,7 +6162,7 @@
           <a:p>
             <a:fld id="{0DACA1DB-A689-4B6C-8997-D716DAE70207}" type="datetime1">
               <a:rPr lang="en-US" smtClean="0"/>
-              <a:t>11/25/2022</a:t>
+              <a:t>11/28/2022</a:t>
             </a:fld>
             <a:endParaRPr lang="en-US"/>
           </a:p>
@@ -6050,7 +6283,7 @@
           <a:p>
             <a:fld id="{90D74FF5-9A9A-4B65-8D23-67993E854576}" type="datetime1">
               <a:rPr lang="en-US" smtClean="0"/>
-              <a:t>11/25/2022</a:t>
+              <a:t>11/28/2022</a:t>
             </a:fld>
             <a:endParaRPr lang="en-US"/>
           </a:p>
@@ -6148,7 +6381,7 @@
           <a:p>
             <a:fld id="{599EE0C3-9D58-464E-8E93-6912E83A035F}" type="datetime1">
               <a:rPr lang="en-US" smtClean="0"/>
-              <a:t>11/25/2022</a:t>
+              <a:t>11/28/2022</a:t>
             </a:fld>
             <a:endParaRPr lang="en-US"/>
           </a:p>
@@ -6430,7 +6663,7 @@
           <a:p>
             <a:fld id="{0E4C19C3-4BCC-43F0-8A3F-E20585F89F47}" type="datetime1">
               <a:rPr lang="en-US" smtClean="0"/>
-              <a:t>11/25/2022</a:t>
+              <a:t>11/28/2022</a:t>
             </a:fld>
             <a:endParaRPr lang="en-US"/>
           </a:p>
@@ -6708,7 +6941,7 @@
           <a:p>
             <a:fld id="{12E6A773-3257-42C5-918B-413CDD6425E3}" type="datetime1">
               <a:rPr lang="en-US" smtClean="0"/>
-              <a:t>11/25/2022</a:t>
+              <a:t>11/28/2022</a:t>
             </a:fld>
             <a:endParaRPr lang="en-US"/>
           </a:p>
@@ -7140,7 +7373,7 @@
           <a:p>
             <a:fld id="{9B5D4B6A-E587-4CBF-868B-EF5606589074}" type="datetime1">
               <a:rPr lang="en-US" smtClean="0"/>
-              <a:t>11/25/2022</a:t>
+              <a:t>11/28/2022</a:t>
             </a:fld>
             <a:endParaRPr lang="en-US"/>
           </a:p>
@@ -8406,6 +8639,165 @@
           <p:cNvPr id="2" name="Title 1">
             <a:extLst>
               <a:ext uri="{FF2B5EF4-FFF2-40B4-BE49-F238E27FC236}">
+                <a16:creationId xmlns:a16="http://schemas.microsoft.com/office/drawing/2014/main" id="{A59BC838-EBB2-E85A-95AE-EB545DB69BCC}"/>
+              </a:ext>
+            </a:extLst>
+          </p:cNvPr>
+          <p:cNvSpPr>
+            <a:spLocks noGrp="1"/>
+          </p:cNvSpPr>
+          <p:nvPr>
+            <p:ph type="title"/>
+          </p:nvPr>
+        </p:nvSpPr>
+        <p:spPr>
+          <a:xfrm>
+            <a:off x="646111" y="452718"/>
+            <a:ext cx="9404723" cy="887195"/>
+          </a:xfrm>
+        </p:spPr>
+        <p:txBody>
+          <a:bodyPr/>
+          <a:lstStyle/>
+          <a:p>
+            <a:r>
+              <a:rPr lang="en-US" dirty="0"/>
+              <a:t>How do we use reactive values?</a:t>
+            </a:r>
+          </a:p>
+        </p:txBody>
+      </p:sp>
+      <p:sp>
+        <p:nvSpPr>
+          <p:cNvPr id="3" name="Footer Placeholder 2">
+            <a:extLst>
+              <a:ext uri="{FF2B5EF4-FFF2-40B4-BE49-F238E27FC236}">
+                <a16:creationId xmlns:a16="http://schemas.microsoft.com/office/drawing/2014/main" id="{36331F02-EEE7-EAC1-DF9D-34940C02F9FE}"/>
+              </a:ext>
+            </a:extLst>
+          </p:cNvPr>
+          <p:cNvSpPr>
+            <a:spLocks noGrp="1"/>
+          </p:cNvSpPr>
+          <p:nvPr>
+            <p:ph type="ftr" sz="quarter" idx="11"/>
+          </p:nvPr>
+        </p:nvSpPr>
+        <p:spPr/>
+        <p:txBody>
+          <a:bodyPr/>
+          <a:lstStyle/>
+          <a:p>
+            <a:r>
+              <a:rPr lang="en-US"/>
+              <a:t>Compiled by Zavaar Shah https://github.com/thatziv</a:t>
+            </a:r>
+          </a:p>
+        </p:txBody>
+      </p:sp>
+      <p:sp>
+        <p:nvSpPr>
+          <p:cNvPr id="5" name="TextBox 4">
+            <a:extLst>
+              <a:ext uri="{FF2B5EF4-FFF2-40B4-BE49-F238E27FC236}">
+                <a16:creationId xmlns:a16="http://schemas.microsoft.com/office/drawing/2014/main" id="{E11F777B-7163-F9B6-C25C-32E7528DA31B}"/>
+              </a:ext>
+            </a:extLst>
+          </p:cNvPr>
+          <p:cNvSpPr txBox="1"/>
+          <p:nvPr/>
+        </p:nvSpPr>
+        <p:spPr>
+          <a:xfrm>
+            <a:off x="646110" y="1447800"/>
+            <a:ext cx="8805708" cy="3363678"/>
+          </a:xfrm>
+          <a:prstGeom prst="rect">
+            <a:avLst/>
+          </a:prstGeom>
+          <a:noFill/>
+        </p:spPr>
+        <p:txBody>
+          <a:bodyPr wrap="square">
+            <a:spAutoFit/>
+          </a:bodyPr>
+          <a:lstStyle/>
+          <a:p>
+            <a:pPr>
+              <a:lnSpc>
+                <a:spcPct val="150000"/>
+              </a:lnSpc>
+            </a:pPr>
+            <a:r>
+              <a:rPr lang="en-US" dirty="0"/>
+              <a:t>For reactive values, we can use the </a:t>
+            </a:r>
+            <a:r>
+              <a:rPr lang="en-US" b="1" dirty="0" err="1"/>
+              <a:t>useState</a:t>
+            </a:r>
+            <a:r>
+              <a:rPr lang="en-US" b="1" dirty="0"/>
+              <a:t> </a:t>
+            </a:r>
+            <a:r>
+              <a:rPr lang="en-US" dirty="0"/>
+              <a:t>hook. Why use a state instead of just declaring a temporary variable and redefining that? </a:t>
+            </a:r>
+            <a:r>
+              <a:rPr lang="en-US" u="sng" dirty="0"/>
+              <a:t>In order to show updated content, your component will unmount, remount and now that data is gone.</a:t>
+            </a:r>
+            <a:r>
+              <a:rPr lang="en-US" dirty="0"/>
+              <a:t> Another problem with this is that our component wouldn’t know when to re-render when our temp variable changes. That is why we have states. States allow for the persistence of data within components throughout a component’s lifecycle. We will learn the stages of a component’s lifecycle later (</a:t>
+            </a:r>
+            <a:r>
+              <a:rPr lang="en-US" b="1" dirty="0" err="1"/>
+              <a:t>useEffect</a:t>
+            </a:r>
+            <a:r>
+              <a:rPr lang="en-US" dirty="0"/>
+              <a:t>).</a:t>
+            </a:r>
+          </a:p>
+        </p:txBody>
+      </p:sp>
+    </p:spTree>
+    <p:extLst>
+      <p:ext uri="{BB962C8B-B14F-4D97-AF65-F5344CB8AC3E}">
+        <p14:creationId xmlns:p14="http://schemas.microsoft.com/office/powerpoint/2010/main" val="4028562526"/>
+      </p:ext>
+    </p:extLst>
+  </p:cSld>
+  <p:clrMapOvr>
+    <a:masterClrMapping/>
+  </p:clrMapOvr>
+</p:sld>
+</file>
+
+<file path=ppt/slides/slide14.xml><?xml version="1.0" encoding="utf-8"?>
+<p:sld xmlns:a="http://schemas.openxmlformats.org/drawingml/2006/main" xmlns:r="http://schemas.openxmlformats.org/officeDocument/2006/relationships" xmlns:p="http://schemas.openxmlformats.org/presentationml/2006/main">
+  <p:cSld>
+    <p:spTree>
+      <p:nvGrpSpPr>
+        <p:cNvPr id="1" name=""/>
+        <p:cNvGrpSpPr/>
+        <p:nvPr/>
+      </p:nvGrpSpPr>
+      <p:grpSpPr>
+        <a:xfrm>
+          <a:off x="0" y="0"/>
+          <a:ext cx="0" cy="0"/>
+          <a:chOff x="0" y="0"/>
+          <a:chExt cx="0" cy="0"/>
+        </a:xfrm>
+      </p:grpSpPr>
+      <p:sp>
+        <p:nvSpPr>
+          <p:cNvPr id="2" name="Title 1">
+            <a:extLst>
+              <a:ext uri="{FF2B5EF4-FFF2-40B4-BE49-F238E27FC236}">
                 <a16:creationId xmlns:a16="http://schemas.microsoft.com/office/drawing/2014/main" id="{C61DEDB4-84B0-1FA5-6D78-7BEAB2390D9E}"/>
               </a:ext>
             </a:extLst>
@@ -8484,7 +8876,7 @@
           <p:nvPr/>
         </p:nvPicPr>
         <p:blipFill>
-          <a:blip r:embed="rId2"/>
+          <a:blip r:embed="rId3"/>
           <a:stretch>
             <a:fillRect/>
           </a:stretch>
@@ -8853,9 +9245,9 @@
           </a:p>
         </p:txBody>
       </p:sp>
-      <mc:AlternateContent xmlns:mc="http://schemas.openxmlformats.org/markup-compatibility/2006">
-        <mc:Choice xmlns:p14="http://schemas.microsoft.com/office/powerpoint/2010/main" Requires="p14">
-          <p:contentPart p14:bwMode="auto" r:id="rId3">
+      <mc:AlternateContent xmlns:mc="http://schemas.openxmlformats.org/markup-compatibility/2006" xmlns:p14="http://schemas.microsoft.com/office/powerpoint/2010/main">
+        <mc:Choice Requires="p14">
+          <p:contentPart p14:bwMode="auto" r:id="rId4">
             <p14:nvContentPartPr>
               <p14:cNvPr id="13" name="Ink 12">
                 <a:extLst>
@@ -8873,7 +9265,7 @@
             </p14:xfrm>
           </p:contentPart>
         </mc:Choice>
-        <mc:Fallback>
+        <mc:Fallback xmlns="">
           <p:pic>
             <p:nvPicPr>
               <p:cNvPr id="13" name="Ink 12">
@@ -8887,7 +9279,7 @@
               <p:nvPr/>
             </p:nvPicPr>
             <p:blipFill>
-              <a:blip r:embed="rId4"/>
+              <a:blip r:embed="rId5"/>
               <a:stretch>
                 <a:fillRect/>
               </a:stretch>
@@ -8904,9 +9296,9 @@
           </p:pic>
         </mc:Fallback>
       </mc:AlternateContent>
-      <mc:AlternateContent xmlns:mc="http://schemas.openxmlformats.org/markup-compatibility/2006">
-        <mc:Choice xmlns:p14="http://schemas.microsoft.com/office/powerpoint/2010/main" Requires="p14">
-          <p:contentPart p14:bwMode="auto" r:id="rId5">
+      <mc:AlternateContent xmlns:mc="http://schemas.openxmlformats.org/markup-compatibility/2006" xmlns:p14="http://schemas.microsoft.com/office/powerpoint/2010/main">
+        <mc:Choice Requires="p14">
+          <p:contentPart p14:bwMode="auto" r:id="rId6">
             <p14:nvContentPartPr>
               <p14:cNvPr id="14" name="Ink 13">
                 <a:extLst>
@@ -8924,7 +9316,7 @@
             </p14:xfrm>
           </p:contentPart>
         </mc:Choice>
-        <mc:Fallback>
+        <mc:Fallback xmlns="">
           <p:pic>
             <p:nvPicPr>
               <p:cNvPr id="14" name="Ink 13">
@@ -8938,7 +9330,7 @@
               <p:nvPr/>
             </p:nvPicPr>
             <p:blipFill>
-              <a:blip r:embed="rId6"/>
+              <a:blip r:embed="rId7"/>
               <a:stretch>
                 <a:fillRect/>
               </a:stretch>
@@ -9003,7 +9395,7 @@
 </p:sld>
 </file>
 
-<file path=ppt/slides/slide14.xml><?xml version="1.0" encoding="utf-8"?>
+<file path=ppt/slides/slide15.xml><?xml version="1.0" encoding="utf-8"?>
 <p:sld xmlns:a="http://schemas.openxmlformats.org/drawingml/2006/main" xmlns:r="http://schemas.openxmlformats.org/officeDocument/2006/relationships" xmlns:p="http://schemas.openxmlformats.org/presentationml/2006/main">
   <p:cSld>
     <p:spTree>
@@ -9224,7 +9616,7 @@
 </p:sld>
 </file>
 
-<file path=ppt/slides/slide15.xml><?xml version="1.0" encoding="utf-8"?>
+<file path=ppt/slides/slide16.xml><?xml version="1.0" encoding="utf-8"?>
 <p:sld xmlns:a="http://schemas.openxmlformats.org/drawingml/2006/main" xmlns:r="http://schemas.openxmlformats.org/officeDocument/2006/relationships" xmlns:p="http://schemas.openxmlformats.org/presentationml/2006/main">
   <p:cSld>
     <p:spTree>
@@ -9477,7 +9869,7 @@
 </p:sld>
 </file>
 
-<file path=ppt/slides/slide16.xml><?xml version="1.0" encoding="utf-8"?>
+<file path=ppt/slides/slide17.xml><?xml version="1.0" encoding="utf-8"?>
 <p:sld xmlns:a="http://schemas.openxmlformats.org/drawingml/2006/main" xmlns:r="http://schemas.openxmlformats.org/officeDocument/2006/relationships" xmlns:p="http://schemas.openxmlformats.org/presentationml/2006/main">
   <p:cSld>
     <p:spTree>
@@ -9599,8 +9991,8 @@
           </a:effectLst>
         </p:spPr>
       </p:pic>
-      <mc:AlternateContent xmlns:mc="http://schemas.openxmlformats.org/markup-compatibility/2006">
-        <mc:Choice xmlns:p14="http://schemas.microsoft.com/office/powerpoint/2010/main" Requires="p14">
+      <mc:AlternateContent xmlns:mc="http://schemas.openxmlformats.org/markup-compatibility/2006" xmlns:p14="http://schemas.microsoft.com/office/powerpoint/2010/main">
+        <mc:Choice Requires="p14">
           <p:contentPart p14:bwMode="auto" r:id="rId3">
             <p14:nvContentPartPr>
               <p14:cNvPr id="8" name="Ink 7">
@@ -9619,7 +10011,7 @@
             </p14:xfrm>
           </p:contentPart>
         </mc:Choice>
-        <mc:Fallback>
+        <mc:Fallback xmlns="">
           <p:pic>
             <p:nvPicPr>
               <p:cNvPr id="8" name="Ink 7">
@@ -9650,8 +10042,8 @@
           </p:pic>
         </mc:Fallback>
       </mc:AlternateContent>
-      <mc:AlternateContent xmlns:mc="http://schemas.openxmlformats.org/markup-compatibility/2006">
-        <mc:Choice xmlns:p14="http://schemas.microsoft.com/office/powerpoint/2010/main" Requires="p14">
+      <mc:AlternateContent xmlns:mc="http://schemas.openxmlformats.org/markup-compatibility/2006" xmlns:p14="http://schemas.microsoft.com/office/powerpoint/2010/main">
+        <mc:Choice Requires="p14">
           <p:contentPart p14:bwMode="auto" r:id="rId5">
             <p14:nvContentPartPr>
               <p14:cNvPr id="14" name="Ink 13">
@@ -9670,7 +10062,7 @@
             </p14:xfrm>
           </p:contentPart>
         </mc:Choice>
-        <mc:Fallback>
+        <mc:Fallback xmlns="">
           <p:pic>
             <p:nvPicPr>
               <p:cNvPr id="14" name="Ink 13">
@@ -9701,8 +10093,8 @@
           </p:pic>
         </mc:Fallback>
       </mc:AlternateContent>
-      <mc:AlternateContent xmlns:mc="http://schemas.openxmlformats.org/markup-compatibility/2006">
-        <mc:Choice xmlns:p14="http://schemas.microsoft.com/office/powerpoint/2010/main" Requires="p14">
+      <mc:AlternateContent xmlns:mc="http://schemas.openxmlformats.org/markup-compatibility/2006" xmlns:p14="http://schemas.microsoft.com/office/powerpoint/2010/main">
+        <mc:Choice Requires="p14">
           <p:contentPart p14:bwMode="auto" r:id="rId7">
             <p14:nvContentPartPr>
               <p14:cNvPr id="17" name="Ink 16">
@@ -9721,7 +10113,7 @@
             </p14:xfrm>
           </p:contentPart>
         </mc:Choice>
-        <mc:Fallback>
+        <mc:Fallback xmlns="">
           <p:pic>
             <p:nvPicPr>
               <p:cNvPr id="17" name="Ink 16">
@@ -9752,8 +10144,8 @@
           </p:pic>
         </mc:Fallback>
       </mc:AlternateContent>
-      <mc:AlternateContent xmlns:mc="http://schemas.openxmlformats.org/markup-compatibility/2006">
-        <mc:Choice xmlns:p14="http://schemas.microsoft.com/office/powerpoint/2010/main" Requires="p14">
+      <mc:AlternateContent xmlns:mc="http://schemas.openxmlformats.org/markup-compatibility/2006" xmlns:p14="http://schemas.microsoft.com/office/powerpoint/2010/main">
+        <mc:Choice Requires="p14">
           <p:contentPart p14:bwMode="auto" r:id="rId9">
             <p14:nvContentPartPr>
               <p14:cNvPr id="19" name="Ink 18">
@@ -9772,7 +10164,7 @@
             </p14:xfrm>
           </p:contentPart>
         </mc:Choice>
-        <mc:Fallback>
+        <mc:Fallback xmlns="">
           <p:pic>
             <p:nvPicPr>
               <p:cNvPr id="19" name="Ink 18">
@@ -9933,7 +10325,7 @@
 </p:sld>
 </file>
 
-<file path=ppt/slides/slide17.xml><?xml version="1.0" encoding="utf-8"?>
+<file path=ppt/slides/slide18.xml><?xml version="1.0" encoding="utf-8"?>
 <p:sld xmlns:a="http://schemas.openxmlformats.org/drawingml/2006/main" xmlns:r="http://schemas.openxmlformats.org/officeDocument/2006/relationships" xmlns:p="http://schemas.openxmlformats.org/presentationml/2006/main">
   <p:cSld>
     <p:spTree>
@@ -10040,8 +10432,8 @@
           </a:p>
         </p:txBody>
       </p:sp>
-      <mc:AlternateContent xmlns:mc="http://schemas.openxmlformats.org/markup-compatibility/2006">
-        <mc:Choice xmlns:p14="http://schemas.microsoft.com/office/powerpoint/2010/main" Requires="p14">
+      <mc:AlternateContent xmlns:mc="http://schemas.openxmlformats.org/markup-compatibility/2006" xmlns:p14="http://schemas.microsoft.com/office/powerpoint/2010/main">
+        <mc:Choice Requires="p14">
           <p:contentPart p14:bwMode="auto" r:id="rId3">
             <p14:nvContentPartPr>
               <p14:cNvPr id="7" name="Ink 6">
@@ -10060,7 +10452,7 @@
             </p14:xfrm>
           </p:contentPart>
         </mc:Choice>
-        <mc:Fallback>
+        <mc:Fallback xmlns="">
           <p:pic>
             <p:nvPicPr>
               <p:cNvPr id="7" name="Ink 6">
@@ -10091,8 +10483,8 @@
           </p:pic>
         </mc:Fallback>
       </mc:AlternateContent>
-      <mc:AlternateContent xmlns:mc="http://schemas.openxmlformats.org/markup-compatibility/2006">
-        <mc:Choice xmlns:p14="http://schemas.microsoft.com/office/powerpoint/2010/main" Requires="p14">
+      <mc:AlternateContent xmlns:mc="http://schemas.openxmlformats.org/markup-compatibility/2006" xmlns:p14="http://schemas.microsoft.com/office/powerpoint/2010/main">
+        <mc:Choice Requires="p14">
           <p:contentPart p14:bwMode="auto" r:id="rId5">
             <p14:nvContentPartPr>
               <p14:cNvPr id="8" name="Ink 7">
@@ -10111,7 +10503,7 @@
             </p14:xfrm>
           </p:contentPart>
         </mc:Choice>
-        <mc:Fallback>
+        <mc:Fallback xmlns="">
           <p:pic>
             <p:nvPicPr>
               <p:cNvPr id="8" name="Ink 7">
@@ -10162,8 +10554,8 @@
             <a:chExt cx="174240" cy="303840"/>
           </a:xfrm>
         </p:grpSpPr>
-        <mc:AlternateContent xmlns:mc="http://schemas.openxmlformats.org/markup-compatibility/2006">
-          <mc:Choice xmlns:p14="http://schemas.microsoft.com/office/powerpoint/2010/main" Requires="p14">
+        <mc:AlternateContent xmlns:mc="http://schemas.openxmlformats.org/markup-compatibility/2006" xmlns:p14="http://schemas.microsoft.com/office/powerpoint/2010/main">
+          <mc:Choice Requires="p14">
             <p:contentPart p14:bwMode="auto" r:id="rId7">
               <p14:nvContentPartPr>
                 <p14:cNvPr id="12" name="Ink 11">
@@ -10182,7 +10574,7 @@
               </p14:xfrm>
             </p:contentPart>
           </mc:Choice>
-          <mc:Fallback>
+          <mc:Fallback xmlns="">
             <p:pic>
               <p:nvPicPr>
                 <p:cNvPr id="12" name="Ink 11">
@@ -10213,8 +10605,8 @@
             </p:pic>
           </mc:Fallback>
         </mc:AlternateContent>
-        <mc:AlternateContent xmlns:mc="http://schemas.openxmlformats.org/markup-compatibility/2006">
-          <mc:Choice xmlns:p14="http://schemas.microsoft.com/office/powerpoint/2010/main" Requires="p14">
+        <mc:AlternateContent xmlns:mc="http://schemas.openxmlformats.org/markup-compatibility/2006" xmlns:p14="http://schemas.microsoft.com/office/powerpoint/2010/main">
+          <mc:Choice Requires="p14">
             <p:contentPart p14:bwMode="auto" r:id="rId9">
               <p14:nvContentPartPr>
                 <p14:cNvPr id="15" name="Ink 14">
@@ -10233,7 +10625,7 @@
               </p14:xfrm>
             </p:contentPart>
           </mc:Choice>
-          <mc:Fallback>
+          <mc:Fallback xmlns="">
             <p:pic>
               <p:nvPicPr>
                 <p:cNvPr id="15" name="Ink 14">
@@ -10265,8 +10657,8 @@
           </mc:Fallback>
         </mc:AlternateContent>
       </p:grpSp>
-      <mc:AlternateContent xmlns:mc="http://schemas.openxmlformats.org/markup-compatibility/2006">
-        <mc:Choice xmlns:p14="http://schemas.microsoft.com/office/powerpoint/2010/main" Requires="p14">
+      <mc:AlternateContent xmlns:mc="http://schemas.openxmlformats.org/markup-compatibility/2006" xmlns:p14="http://schemas.microsoft.com/office/powerpoint/2010/main">
+        <mc:Choice Requires="p14">
           <p:contentPart p14:bwMode="auto" r:id="rId11">
             <p14:nvContentPartPr>
               <p14:cNvPr id="17" name="Ink 16">
@@ -10285,7 +10677,7 @@
             </p14:xfrm>
           </p:contentPart>
         </mc:Choice>
-        <mc:Fallback>
+        <mc:Fallback xmlns="">
           <p:pic>
             <p:nvPicPr>
               <p:cNvPr id="17" name="Ink 16">
@@ -10329,7 +10721,7 @@
 </p:sld>
 </file>
 
-<file path=ppt/slides/slide18.xml><?xml version="1.0" encoding="utf-8"?>
+<file path=ppt/slides/slide19.xml><?xml version="1.0" encoding="utf-8"?>
 <p:sld xmlns:a="http://schemas.openxmlformats.org/drawingml/2006/main" xmlns:r="http://schemas.openxmlformats.org/officeDocument/2006/relationships" xmlns:p="http://schemas.openxmlformats.org/presentationml/2006/main">
   <p:cSld>
     <p:spTree>
@@ -10525,168 +10917,6 @@
     <p:extLst>
       <p:ext uri="{BB962C8B-B14F-4D97-AF65-F5344CB8AC3E}">
         <p14:creationId xmlns:p14="http://schemas.microsoft.com/office/powerpoint/2010/main" val="441690617"/>
-      </p:ext>
-    </p:extLst>
-  </p:cSld>
-  <p:clrMapOvr>
-    <a:masterClrMapping/>
-  </p:clrMapOvr>
-</p:sld>
-</file>
-
-<file path=ppt/slides/slide19.xml><?xml version="1.0" encoding="utf-8"?>
-<p:sld xmlns:a="http://schemas.openxmlformats.org/drawingml/2006/main" xmlns:r="http://schemas.openxmlformats.org/officeDocument/2006/relationships" xmlns:p="http://schemas.openxmlformats.org/presentationml/2006/main">
-  <p:cSld>
-    <p:spTree>
-      <p:nvGrpSpPr>
-        <p:cNvPr id="1" name=""/>
-        <p:cNvGrpSpPr/>
-        <p:nvPr/>
-      </p:nvGrpSpPr>
-      <p:grpSpPr>
-        <a:xfrm>
-          <a:off x="0" y="0"/>
-          <a:ext cx="0" cy="0"/>
-          <a:chOff x="0" y="0"/>
-          <a:chExt cx="0" cy="0"/>
-        </a:xfrm>
-      </p:grpSpPr>
-      <p:sp>
-        <p:nvSpPr>
-          <p:cNvPr id="2" name="Title 1">
-            <a:extLst>
-              <a:ext uri="{FF2B5EF4-FFF2-40B4-BE49-F238E27FC236}">
-                <a16:creationId xmlns:a16="http://schemas.microsoft.com/office/drawing/2014/main" id="{4B20C9CD-E559-E618-5056-090AE2EB25BD}"/>
-              </a:ext>
-            </a:extLst>
-          </p:cNvPr>
-          <p:cNvSpPr>
-            <a:spLocks noGrp="1"/>
-          </p:cNvSpPr>
-          <p:nvPr>
-            <p:ph type="title"/>
-          </p:nvPr>
-        </p:nvSpPr>
-        <p:spPr/>
-        <p:txBody>
-          <a:bodyPr/>
-          <a:lstStyle/>
-          <a:p>
-            <a:r>
-              <a:rPr lang="en-US" dirty="0"/>
-              <a:t>React – Hooks: </a:t>
-            </a:r>
-            <a:r>
-              <a:rPr lang="en-US" b="1" dirty="0" err="1"/>
-              <a:t>useContext</a:t>
-            </a:r>
-            <a:endParaRPr lang="en-US" dirty="0"/>
-          </a:p>
-        </p:txBody>
-      </p:sp>
-      <p:sp>
-        <p:nvSpPr>
-          <p:cNvPr id="3" name="Content Placeholder 2">
-            <a:extLst>
-              <a:ext uri="{FF2B5EF4-FFF2-40B4-BE49-F238E27FC236}">
-                <a16:creationId xmlns:a16="http://schemas.microsoft.com/office/drawing/2014/main" id="{14970CE3-F0C0-EAC9-48FF-E915F131EF82}"/>
-              </a:ext>
-            </a:extLst>
-          </p:cNvPr>
-          <p:cNvSpPr>
-            <a:spLocks noGrp="1"/>
-          </p:cNvSpPr>
-          <p:nvPr>
-            <p:ph idx="1"/>
-          </p:nvPr>
-        </p:nvSpPr>
-        <p:spPr>
-          <a:xfrm>
-            <a:off x="1104293" y="1447800"/>
-            <a:ext cx="8946541" cy="4195481"/>
-          </a:xfrm>
-        </p:spPr>
-        <p:txBody>
-          <a:bodyPr>
-            <a:normAutofit/>
-          </a:bodyPr>
-          <a:lstStyle/>
-          <a:p>
-            <a:r>
-              <a:rPr lang="en-US" sz="2800" dirty="0"/>
-              <a:t>Contexts can be a bit tricky but very important when scaling your application up</a:t>
-            </a:r>
-          </a:p>
-          <a:p>
-            <a:r>
-              <a:rPr lang="en-US" sz="2800" dirty="0"/>
-              <a:t>Contexts allow sharing data between components without using props.</a:t>
-            </a:r>
-          </a:p>
-          <a:p>
-            <a:pPr lvl="1"/>
-            <a:r>
-              <a:rPr lang="en-US" sz="2000" b="1" dirty="0"/>
-              <a:t>Context Providers</a:t>
-            </a:r>
-            <a:r>
-              <a:rPr lang="en-US" sz="2000" dirty="0"/>
-              <a:t> allow for the use of </a:t>
-            </a:r>
-            <a:r>
-              <a:rPr lang="en-US" sz="2000" b="1" dirty="0" err="1"/>
-              <a:t>useContext</a:t>
-            </a:r>
-            <a:r>
-              <a:rPr lang="en-US" sz="2000" b="1" dirty="0"/>
-              <a:t> </a:t>
-            </a:r>
-            <a:r>
-              <a:rPr lang="en-US" sz="2000" dirty="0"/>
-              <a:t>and must be the child of a provider to use its values</a:t>
-            </a:r>
-          </a:p>
-          <a:p>
-            <a:pPr lvl="1"/>
-            <a:endParaRPr lang="en-US" sz="2400" b="1" dirty="0"/>
-          </a:p>
-          <a:p>
-            <a:endParaRPr lang="en-US" sz="2800" dirty="0"/>
-          </a:p>
-        </p:txBody>
-      </p:sp>
-      <p:sp>
-        <p:nvSpPr>
-          <p:cNvPr id="4" name="Footer Placeholder 3">
-            <a:extLst>
-              <a:ext uri="{FF2B5EF4-FFF2-40B4-BE49-F238E27FC236}">
-                <a16:creationId xmlns:a16="http://schemas.microsoft.com/office/drawing/2014/main" id="{B9CAA90E-5BD0-653A-85BC-995DC552FF63}"/>
-              </a:ext>
-            </a:extLst>
-          </p:cNvPr>
-          <p:cNvSpPr>
-            <a:spLocks noGrp="1"/>
-          </p:cNvSpPr>
-          <p:nvPr>
-            <p:ph type="ftr" sz="quarter" idx="11"/>
-          </p:nvPr>
-        </p:nvSpPr>
-        <p:spPr/>
-        <p:txBody>
-          <a:bodyPr/>
-          <a:lstStyle/>
-          <a:p>
-            <a:r>
-              <a:rPr lang="en-US"/>
-              <a:t>Compiled by Zavaar Shah https://github.com/thatziv</a:t>
-            </a:r>
-          </a:p>
-        </p:txBody>
-      </p:sp>
-    </p:spTree>
-    <p:extLst>
-      <p:ext uri="{BB962C8B-B14F-4D97-AF65-F5344CB8AC3E}">
-        <p14:creationId xmlns:p14="http://schemas.microsoft.com/office/powerpoint/2010/main" val="2181698844"/>
       </p:ext>
     </p:extLst>
   </p:cSld>
@@ -10980,6 +11210,168 @@
           <p:cNvPr id="2" name="Title 1">
             <a:extLst>
               <a:ext uri="{FF2B5EF4-FFF2-40B4-BE49-F238E27FC236}">
+                <a16:creationId xmlns:a16="http://schemas.microsoft.com/office/drawing/2014/main" id="{4B20C9CD-E559-E618-5056-090AE2EB25BD}"/>
+              </a:ext>
+            </a:extLst>
+          </p:cNvPr>
+          <p:cNvSpPr>
+            <a:spLocks noGrp="1"/>
+          </p:cNvSpPr>
+          <p:nvPr>
+            <p:ph type="title"/>
+          </p:nvPr>
+        </p:nvSpPr>
+        <p:spPr/>
+        <p:txBody>
+          <a:bodyPr/>
+          <a:lstStyle/>
+          <a:p>
+            <a:r>
+              <a:rPr lang="en-US" dirty="0"/>
+              <a:t>React – Hooks: </a:t>
+            </a:r>
+            <a:r>
+              <a:rPr lang="en-US" b="1" dirty="0" err="1"/>
+              <a:t>useContext</a:t>
+            </a:r>
+            <a:endParaRPr lang="en-US" dirty="0"/>
+          </a:p>
+        </p:txBody>
+      </p:sp>
+      <p:sp>
+        <p:nvSpPr>
+          <p:cNvPr id="3" name="Content Placeholder 2">
+            <a:extLst>
+              <a:ext uri="{FF2B5EF4-FFF2-40B4-BE49-F238E27FC236}">
+                <a16:creationId xmlns:a16="http://schemas.microsoft.com/office/drawing/2014/main" id="{14970CE3-F0C0-EAC9-48FF-E915F131EF82}"/>
+              </a:ext>
+            </a:extLst>
+          </p:cNvPr>
+          <p:cNvSpPr>
+            <a:spLocks noGrp="1"/>
+          </p:cNvSpPr>
+          <p:nvPr>
+            <p:ph idx="1"/>
+          </p:nvPr>
+        </p:nvSpPr>
+        <p:spPr>
+          <a:xfrm>
+            <a:off x="1104293" y="1447800"/>
+            <a:ext cx="8946541" cy="4195481"/>
+          </a:xfrm>
+        </p:spPr>
+        <p:txBody>
+          <a:bodyPr>
+            <a:normAutofit/>
+          </a:bodyPr>
+          <a:lstStyle/>
+          <a:p>
+            <a:r>
+              <a:rPr lang="en-US" sz="2800" dirty="0"/>
+              <a:t>Contexts can be a bit tricky but very important when scaling your application up</a:t>
+            </a:r>
+          </a:p>
+          <a:p>
+            <a:r>
+              <a:rPr lang="en-US" sz="2800" dirty="0"/>
+              <a:t>Contexts allow sharing data between components without using props.</a:t>
+            </a:r>
+          </a:p>
+          <a:p>
+            <a:pPr lvl="1"/>
+            <a:r>
+              <a:rPr lang="en-US" sz="2000" b="1" dirty="0"/>
+              <a:t>Context Providers</a:t>
+            </a:r>
+            <a:r>
+              <a:rPr lang="en-US" sz="2000" dirty="0"/>
+              <a:t> allow for the use of </a:t>
+            </a:r>
+            <a:r>
+              <a:rPr lang="en-US" sz="2000" b="1" dirty="0" err="1"/>
+              <a:t>useContext</a:t>
+            </a:r>
+            <a:r>
+              <a:rPr lang="en-US" sz="2000" b="1" dirty="0"/>
+              <a:t> </a:t>
+            </a:r>
+            <a:r>
+              <a:rPr lang="en-US" sz="2000" dirty="0"/>
+              <a:t>and must be the child of a provider to use its values</a:t>
+            </a:r>
+          </a:p>
+          <a:p>
+            <a:pPr lvl="1"/>
+            <a:endParaRPr lang="en-US" sz="2400" b="1" dirty="0"/>
+          </a:p>
+          <a:p>
+            <a:endParaRPr lang="en-US" sz="2800" dirty="0"/>
+          </a:p>
+        </p:txBody>
+      </p:sp>
+      <p:sp>
+        <p:nvSpPr>
+          <p:cNvPr id="4" name="Footer Placeholder 3">
+            <a:extLst>
+              <a:ext uri="{FF2B5EF4-FFF2-40B4-BE49-F238E27FC236}">
+                <a16:creationId xmlns:a16="http://schemas.microsoft.com/office/drawing/2014/main" id="{B9CAA90E-5BD0-653A-85BC-995DC552FF63}"/>
+              </a:ext>
+            </a:extLst>
+          </p:cNvPr>
+          <p:cNvSpPr>
+            <a:spLocks noGrp="1"/>
+          </p:cNvSpPr>
+          <p:nvPr>
+            <p:ph type="ftr" sz="quarter" idx="11"/>
+          </p:nvPr>
+        </p:nvSpPr>
+        <p:spPr/>
+        <p:txBody>
+          <a:bodyPr/>
+          <a:lstStyle/>
+          <a:p>
+            <a:r>
+              <a:rPr lang="en-US"/>
+              <a:t>Compiled by Zavaar Shah https://github.com/thatziv</a:t>
+            </a:r>
+          </a:p>
+        </p:txBody>
+      </p:sp>
+    </p:spTree>
+    <p:extLst>
+      <p:ext uri="{BB962C8B-B14F-4D97-AF65-F5344CB8AC3E}">
+        <p14:creationId xmlns:p14="http://schemas.microsoft.com/office/powerpoint/2010/main" val="2181698844"/>
+      </p:ext>
+    </p:extLst>
+  </p:cSld>
+  <p:clrMapOvr>
+    <a:masterClrMapping/>
+  </p:clrMapOvr>
+</p:sld>
+</file>
+
+<file path=ppt/slides/slide21.xml><?xml version="1.0" encoding="utf-8"?>
+<p:sld xmlns:a="http://schemas.openxmlformats.org/drawingml/2006/main" xmlns:r="http://schemas.openxmlformats.org/officeDocument/2006/relationships" xmlns:p="http://schemas.openxmlformats.org/presentationml/2006/main">
+  <p:cSld>
+    <p:spTree>
+      <p:nvGrpSpPr>
+        <p:cNvPr id="1" name=""/>
+        <p:cNvGrpSpPr/>
+        <p:nvPr/>
+      </p:nvGrpSpPr>
+      <p:grpSpPr>
+        <a:xfrm>
+          <a:off x="0" y="0"/>
+          <a:ext cx="0" cy="0"/>
+          <a:chOff x="0" y="0"/>
+          <a:chExt cx="0" cy="0"/>
+        </a:xfrm>
+      </p:grpSpPr>
+      <p:sp>
+        <p:nvSpPr>
+          <p:cNvPr id="2" name="Title 1">
+            <a:extLst>
+              <a:ext uri="{FF2B5EF4-FFF2-40B4-BE49-F238E27FC236}">
                 <a16:creationId xmlns:a16="http://schemas.microsoft.com/office/drawing/2014/main" id="{402560C2-3D98-5929-5D2B-3268B658C94B}"/>
               </a:ext>
             </a:extLst>
@@ -11130,8 +11522,8 @@
           </a:extLst>
         </p:spPr>
       </p:pic>
-      <mc:AlternateContent xmlns:mc="http://schemas.openxmlformats.org/markup-compatibility/2006">
-        <mc:Choice xmlns:p14="http://schemas.microsoft.com/office/powerpoint/2010/main" Requires="p14">
+      <mc:AlternateContent xmlns:mc="http://schemas.openxmlformats.org/markup-compatibility/2006" xmlns:p14="http://schemas.microsoft.com/office/powerpoint/2010/main">
+        <mc:Choice Requires="p14">
           <p:contentPart p14:bwMode="auto" r:id="rId4">
             <p14:nvContentPartPr>
               <p14:cNvPr id="8" name="Ink 7">
@@ -11150,7 +11542,7 @@
             </p14:xfrm>
           </p:contentPart>
         </mc:Choice>
-        <mc:Fallback>
+        <mc:Fallback xmlns="">
           <p:pic>
             <p:nvPicPr>
               <p:cNvPr id="8" name="Ink 7">
@@ -11181,8 +11573,8 @@
           </p:pic>
         </mc:Fallback>
       </mc:AlternateContent>
-      <mc:AlternateContent xmlns:mc="http://schemas.openxmlformats.org/markup-compatibility/2006">
-        <mc:Choice xmlns:p14="http://schemas.microsoft.com/office/powerpoint/2010/main" Requires="p14">
+      <mc:AlternateContent xmlns:mc="http://schemas.openxmlformats.org/markup-compatibility/2006" xmlns:p14="http://schemas.microsoft.com/office/powerpoint/2010/main">
+        <mc:Choice Requires="p14">
           <p:contentPart p14:bwMode="auto" r:id="rId6">
             <p14:nvContentPartPr>
               <p14:cNvPr id="10" name="Ink 9">
@@ -11201,7 +11593,7 @@
             </p14:xfrm>
           </p:contentPart>
         </mc:Choice>
-        <mc:Fallback>
+        <mc:Fallback xmlns="">
           <p:pic>
             <p:nvPicPr>
               <p:cNvPr id="10" name="Ink 9">
@@ -11232,8 +11624,8 @@
           </p:pic>
         </mc:Fallback>
       </mc:AlternateContent>
-      <mc:AlternateContent xmlns:mc="http://schemas.openxmlformats.org/markup-compatibility/2006">
-        <mc:Choice xmlns:p14="http://schemas.microsoft.com/office/powerpoint/2010/main" Requires="p14">
+      <mc:AlternateContent xmlns:mc="http://schemas.openxmlformats.org/markup-compatibility/2006" xmlns:p14="http://schemas.microsoft.com/office/powerpoint/2010/main">
+        <mc:Choice Requires="p14">
           <p:contentPart p14:bwMode="auto" r:id="rId8">
             <p14:nvContentPartPr>
               <p14:cNvPr id="12" name="Ink 11">
@@ -11252,7 +11644,7 @@
             </p14:xfrm>
           </p:contentPart>
         </mc:Choice>
-        <mc:Fallback>
+        <mc:Fallback xmlns="">
           <p:pic>
             <p:nvPicPr>
               <p:cNvPr id="12" name="Ink 11">
@@ -11283,8 +11675,8 @@
           </p:pic>
         </mc:Fallback>
       </mc:AlternateContent>
-      <mc:AlternateContent xmlns:mc="http://schemas.openxmlformats.org/markup-compatibility/2006">
-        <mc:Choice xmlns:p14="http://schemas.microsoft.com/office/powerpoint/2010/main" Requires="p14">
+      <mc:AlternateContent xmlns:mc="http://schemas.openxmlformats.org/markup-compatibility/2006" xmlns:p14="http://schemas.microsoft.com/office/powerpoint/2010/main">
+        <mc:Choice Requires="p14">
           <p:contentPart p14:bwMode="auto" r:id="rId10">
             <p14:nvContentPartPr>
               <p14:cNvPr id="13" name="Ink 12">
@@ -11303,7 +11695,7 @@
             </p14:xfrm>
           </p:contentPart>
         </mc:Choice>
-        <mc:Fallback>
+        <mc:Fallback xmlns="">
           <p:pic>
             <p:nvPicPr>
               <p:cNvPr id="13" name="Ink 12">
@@ -11452,7 +11844,7 @@
 </p:sld>
 </file>
 
-<file path=ppt/slides/slide21.xml><?xml version="1.0" encoding="utf-8"?>
+<file path=ppt/slides/slide22.xml><?xml version="1.0" encoding="utf-8"?>
 <p:sld xmlns:a="http://schemas.openxmlformats.org/drawingml/2006/main" xmlns:r="http://schemas.openxmlformats.org/officeDocument/2006/relationships" xmlns:p="http://schemas.openxmlformats.org/presentationml/2006/main">
   <p:cSld>
     <p:spTree>
@@ -11487,7 +11879,7 @@
         </p:nvSpPr>
         <p:spPr>
           <a:xfrm>
-            <a:off x="646111" y="452718"/>
+            <a:off x="646111" y="207792"/>
             <a:ext cx="9793289" cy="1400530"/>
           </a:xfrm>
         </p:spPr>
@@ -11525,7 +11917,7 @@
         </p:nvSpPr>
         <p:spPr>
           <a:xfrm>
-            <a:off x="1104293" y="1447800"/>
+            <a:off x="646111" y="895809"/>
             <a:ext cx="8946541" cy="4195481"/>
           </a:xfrm>
         </p:spPr>
@@ -11616,6 +12008,55 @@
           </a:p>
         </p:txBody>
       </p:sp>
+      <p:pic>
+        <p:nvPicPr>
+          <p:cNvPr id="6" name="Picture 5" descr="Diagram&#10;&#10;Description automatically generated">
+            <a:extLst>
+              <a:ext uri="{FF2B5EF4-FFF2-40B4-BE49-F238E27FC236}">
+                <a16:creationId xmlns:a16="http://schemas.microsoft.com/office/drawing/2014/main" id="{A65D2964-F498-3087-41FB-323DA678010B}"/>
+              </a:ext>
+            </a:extLst>
+          </p:cNvPr>
+          <p:cNvPicPr>
+            <a:picLocks noChangeAspect="1"/>
+          </p:cNvPicPr>
+          <p:nvPr/>
+        </p:nvPicPr>
+        <p:blipFill>
+          <a:blip r:embed="rId3">
+            <a:extLst>
+              <a:ext uri="{28A0092B-C50C-407E-A947-70E740481C1C}">
+                <a14:useLocalDpi xmlns:a14="http://schemas.microsoft.com/office/drawing/2010/main" val="0"/>
+              </a:ext>
+            </a:extLst>
+          </a:blip>
+          <a:stretch>
+            <a:fillRect/>
+          </a:stretch>
+        </p:blipFill>
+        <p:spPr>
+          <a:xfrm>
+            <a:off x="5542754" y="4492511"/>
+            <a:ext cx="3429229" cy="2254959"/>
+          </a:xfrm>
+          <a:prstGeom prst="roundRect">
+            <a:avLst>
+              <a:gd name="adj" fmla="val 8594"/>
+            </a:avLst>
+          </a:prstGeom>
+          <a:solidFill>
+            <a:srgbClr val="FFFFFF">
+              <a:shade val="85000"/>
+            </a:srgbClr>
+          </a:solidFill>
+          <a:ln>
+            <a:noFill/>
+          </a:ln>
+          <a:effectLst>
+            <a:reflection blurRad="12700" stA="38000" endPos="28000" dist="5000" dir="5400000" sy="-100000" algn="bl" rotWithShape="0"/>
+          </a:effectLst>
+        </p:spPr>
+      </p:pic>
     </p:spTree>
     <p:extLst>
       <p:ext uri="{BB962C8B-B14F-4D97-AF65-F5344CB8AC3E}">
@@ -11629,7 +12070,7 @@
 </p:sld>
 </file>
 
-<file path=ppt/slides/slide22.xml><?xml version="1.0" encoding="utf-8"?>
+<file path=ppt/slides/slide23.xml><?xml version="1.0" encoding="utf-8"?>
 <p:sld xmlns:a="http://schemas.openxmlformats.org/drawingml/2006/main" xmlns:r="http://schemas.openxmlformats.org/officeDocument/2006/relationships" xmlns:p="http://schemas.openxmlformats.org/presentationml/2006/main">
   <p:cSld>
     <p:spTree>
@@ -11742,8 +12183,8 @@
           </a:prstGeom>
         </p:spPr>
       </p:pic>
-      <mc:AlternateContent xmlns:mc="http://schemas.openxmlformats.org/markup-compatibility/2006">
-        <mc:Choice xmlns:p14="http://schemas.microsoft.com/office/powerpoint/2010/main" Requires="p14">
+      <mc:AlternateContent xmlns:mc="http://schemas.openxmlformats.org/markup-compatibility/2006" xmlns:p14="http://schemas.microsoft.com/office/powerpoint/2010/main">
+        <mc:Choice Requires="p14">
           <p:contentPart p14:bwMode="auto" r:id="rId3">
             <p14:nvContentPartPr>
               <p14:cNvPr id="7" name="Ink 6">
@@ -11762,7 +12203,7 @@
             </p14:xfrm>
           </p:contentPart>
         </mc:Choice>
-        <mc:Fallback>
+        <mc:Fallback xmlns="">
           <p:pic>
             <p:nvPicPr>
               <p:cNvPr id="7" name="Ink 6">
@@ -11793,8 +12234,8 @@
           </p:pic>
         </mc:Fallback>
       </mc:AlternateContent>
-      <mc:AlternateContent xmlns:mc="http://schemas.openxmlformats.org/markup-compatibility/2006">
-        <mc:Choice xmlns:p14="http://schemas.microsoft.com/office/powerpoint/2010/main" Requires="p14">
+      <mc:AlternateContent xmlns:mc="http://schemas.openxmlformats.org/markup-compatibility/2006" xmlns:p14="http://schemas.microsoft.com/office/powerpoint/2010/main">
+        <mc:Choice Requires="p14">
           <p:contentPart p14:bwMode="auto" r:id="rId5">
             <p14:nvContentPartPr>
               <p14:cNvPr id="8" name="Ink 7">
@@ -11813,7 +12254,7 @@
             </p14:xfrm>
           </p:contentPart>
         </mc:Choice>
-        <mc:Fallback>
+        <mc:Fallback xmlns="">
           <p:pic>
             <p:nvPicPr>
               <p:cNvPr id="8" name="Ink 7">
@@ -11844,8 +12285,8 @@
           </p:pic>
         </mc:Fallback>
       </mc:AlternateContent>
-      <mc:AlternateContent xmlns:mc="http://schemas.openxmlformats.org/markup-compatibility/2006">
-        <mc:Choice xmlns:p14="http://schemas.microsoft.com/office/powerpoint/2010/main" Requires="p14">
+      <mc:AlternateContent xmlns:mc="http://schemas.openxmlformats.org/markup-compatibility/2006" xmlns:p14="http://schemas.microsoft.com/office/powerpoint/2010/main">
+        <mc:Choice Requires="p14">
           <p:contentPart p14:bwMode="auto" r:id="rId7">
             <p14:nvContentPartPr>
               <p14:cNvPr id="9" name="Ink 8">
@@ -11864,7 +12305,7 @@
             </p14:xfrm>
           </p:contentPart>
         </mc:Choice>
-        <mc:Fallback>
+        <mc:Fallback xmlns="">
           <p:pic>
             <p:nvPicPr>
               <p:cNvPr id="9" name="Ink 8">
@@ -11895,8 +12336,8 @@
           </p:pic>
         </mc:Fallback>
       </mc:AlternateContent>
-      <mc:AlternateContent xmlns:mc="http://schemas.openxmlformats.org/markup-compatibility/2006">
-        <mc:Choice xmlns:p14="http://schemas.microsoft.com/office/powerpoint/2010/main" Requires="p14">
+      <mc:AlternateContent xmlns:mc="http://schemas.openxmlformats.org/markup-compatibility/2006" xmlns:p14="http://schemas.microsoft.com/office/powerpoint/2010/main">
+        <mc:Choice Requires="p14">
           <p:contentPart p14:bwMode="auto" r:id="rId9">
             <p14:nvContentPartPr>
               <p14:cNvPr id="10" name="Ink 9">
@@ -11915,7 +12356,7 @@
             </p14:xfrm>
           </p:contentPart>
         </mc:Choice>
-        <mc:Fallback>
+        <mc:Fallback xmlns="">
           <p:pic>
             <p:nvPicPr>
               <p:cNvPr id="10" name="Ink 9">
@@ -11966,8 +12407,8 @@
             <a:chExt cx="3453120" cy="1100520"/>
           </a:xfrm>
         </p:grpSpPr>
-        <mc:AlternateContent xmlns:mc="http://schemas.openxmlformats.org/markup-compatibility/2006">
-          <mc:Choice xmlns:p14="http://schemas.microsoft.com/office/powerpoint/2010/main" Requires="p14">
+        <mc:AlternateContent xmlns:mc="http://schemas.openxmlformats.org/markup-compatibility/2006" xmlns:p14="http://schemas.microsoft.com/office/powerpoint/2010/main">
+          <mc:Choice Requires="p14">
             <p:contentPart p14:bwMode="auto" r:id="rId11">
               <p14:nvContentPartPr>
                 <p14:cNvPr id="11" name="Ink 10">
@@ -11986,7 +12427,7 @@
               </p14:xfrm>
             </p:contentPart>
           </mc:Choice>
-          <mc:Fallback>
+          <mc:Fallback xmlns="">
             <p:pic>
               <p:nvPicPr>
                 <p:cNvPr id="11" name="Ink 10">
@@ -12017,8 +12458,8 @@
             </p:pic>
           </mc:Fallback>
         </mc:AlternateContent>
-        <mc:AlternateContent xmlns:mc="http://schemas.openxmlformats.org/markup-compatibility/2006">
-          <mc:Choice xmlns:p14="http://schemas.microsoft.com/office/powerpoint/2010/main" Requires="p14">
+        <mc:AlternateContent xmlns:mc="http://schemas.openxmlformats.org/markup-compatibility/2006" xmlns:p14="http://schemas.microsoft.com/office/powerpoint/2010/main">
+          <mc:Choice Requires="p14">
             <p:contentPart p14:bwMode="auto" r:id="rId13">
               <p14:nvContentPartPr>
                 <p14:cNvPr id="12" name="Ink 11">
@@ -12037,7 +12478,7 @@
               </p14:xfrm>
             </p:contentPart>
           </mc:Choice>
-          <mc:Fallback>
+          <mc:Fallback xmlns="">
             <p:pic>
               <p:nvPicPr>
                 <p:cNvPr id="12" name="Ink 11">
@@ -12114,8 +12555,8 @@
           </a:p>
         </p:txBody>
       </p:sp>
-      <mc:AlternateContent xmlns:mc="http://schemas.openxmlformats.org/markup-compatibility/2006">
-        <mc:Choice xmlns:p14="http://schemas.microsoft.com/office/powerpoint/2010/main" Requires="p14">
+      <mc:AlternateContent xmlns:mc="http://schemas.openxmlformats.org/markup-compatibility/2006" xmlns:p14="http://schemas.microsoft.com/office/powerpoint/2010/main">
+        <mc:Choice Requires="p14">
           <p:contentPart p14:bwMode="auto" r:id="rId15">
             <p14:nvContentPartPr>
               <p14:cNvPr id="17" name="Ink 16">
@@ -12134,7 +12575,7 @@
             </p14:xfrm>
           </p:contentPart>
         </mc:Choice>
-        <mc:Fallback>
+        <mc:Fallback xmlns="">
           <p:pic>
             <p:nvPicPr>
               <p:cNvPr id="17" name="Ink 16">
@@ -12165,8 +12606,8 @@
           </p:pic>
         </mc:Fallback>
       </mc:AlternateContent>
-      <mc:AlternateContent xmlns:mc="http://schemas.openxmlformats.org/markup-compatibility/2006">
-        <mc:Choice xmlns:p14="http://schemas.microsoft.com/office/powerpoint/2010/main" Requires="p14">
+      <mc:AlternateContent xmlns:mc="http://schemas.openxmlformats.org/markup-compatibility/2006" xmlns:p14="http://schemas.microsoft.com/office/powerpoint/2010/main">
+        <mc:Choice Requires="p14">
           <p:contentPart p14:bwMode="auto" r:id="rId17">
             <p14:nvContentPartPr>
               <p14:cNvPr id="18" name="Ink 17">
@@ -12185,7 +12626,7 @@
             </p14:xfrm>
           </p:contentPart>
         </mc:Choice>
-        <mc:Fallback>
+        <mc:Fallback xmlns="">
           <p:pic>
             <p:nvPicPr>
               <p:cNvPr id="18" name="Ink 17">
@@ -12216,8 +12657,8 @@
           </p:pic>
         </mc:Fallback>
       </mc:AlternateContent>
-      <mc:AlternateContent xmlns:mc="http://schemas.openxmlformats.org/markup-compatibility/2006">
-        <mc:Choice xmlns:p14="http://schemas.microsoft.com/office/powerpoint/2010/main" Requires="p14">
+      <mc:AlternateContent xmlns:mc="http://schemas.openxmlformats.org/markup-compatibility/2006" xmlns:p14="http://schemas.microsoft.com/office/powerpoint/2010/main">
+        <mc:Choice Requires="p14">
           <p:contentPart p14:bwMode="auto" r:id="rId19">
             <p14:nvContentPartPr>
               <p14:cNvPr id="20" name="Ink 19">
@@ -12236,7 +12677,7 @@
             </p14:xfrm>
           </p:contentPart>
         </mc:Choice>
-        <mc:Fallback>
+        <mc:Fallback xmlns="">
           <p:pic>
             <p:nvPicPr>
               <p:cNvPr id="20" name="Ink 19">
@@ -12267,8 +12708,8 @@
           </p:pic>
         </mc:Fallback>
       </mc:AlternateContent>
-      <mc:AlternateContent xmlns:mc="http://schemas.openxmlformats.org/markup-compatibility/2006">
-        <mc:Choice xmlns:p14="http://schemas.microsoft.com/office/powerpoint/2010/main" Requires="p14">
+      <mc:AlternateContent xmlns:mc="http://schemas.openxmlformats.org/markup-compatibility/2006" xmlns:p14="http://schemas.microsoft.com/office/powerpoint/2010/main">
+        <mc:Choice Requires="p14">
           <p:contentPart p14:bwMode="auto" r:id="rId21">
             <p14:nvContentPartPr>
               <p14:cNvPr id="21" name="Ink 20">
@@ -12287,7 +12728,7 @@
             </p14:xfrm>
           </p:contentPart>
         </mc:Choice>
-        <mc:Fallback>
+        <mc:Fallback xmlns="">
           <p:pic>
             <p:nvPicPr>
               <p:cNvPr id="21" name="Ink 20">
@@ -12338,8 +12779,8 @@
             <a:chExt cx="589320" cy="462240"/>
           </a:xfrm>
         </p:grpSpPr>
-        <mc:AlternateContent xmlns:mc="http://schemas.openxmlformats.org/markup-compatibility/2006">
-          <mc:Choice xmlns:p14="http://schemas.microsoft.com/office/powerpoint/2010/main" Requires="p14">
+        <mc:AlternateContent xmlns:mc="http://schemas.openxmlformats.org/markup-compatibility/2006" xmlns:p14="http://schemas.microsoft.com/office/powerpoint/2010/main">
+          <mc:Choice Requires="p14">
             <p:contentPart p14:bwMode="auto" r:id="rId23">
               <p14:nvContentPartPr>
                 <p14:cNvPr id="24" name="Ink 23">
@@ -12358,7 +12799,7 @@
               </p14:xfrm>
             </p:contentPart>
           </mc:Choice>
-          <mc:Fallback>
+          <mc:Fallback xmlns="">
             <p:pic>
               <p:nvPicPr>
                 <p:cNvPr id="24" name="Ink 23">
@@ -12389,8 +12830,8 @@
             </p:pic>
           </mc:Fallback>
         </mc:AlternateContent>
-        <mc:AlternateContent xmlns:mc="http://schemas.openxmlformats.org/markup-compatibility/2006">
-          <mc:Choice xmlns:p14="http://schemas.microsoft.com/office/powerpoint/2010/main" Requires="p14">
+        <mc:AlternateContent xmlns:mc="http://schemas.openxmlformats.org/markup-compatibility/2006" xmlns:p14="http://schemas.microsoft.com/office/powerpoint/2010/main">
+          <mc:Choice Requires="p14">
             <p:contentPart p14:bwMode="auto" r:id="rId25">
               <p14:nvContentPartPr>
                 <p14:cNvPr id="25" name="Ink 24">
@@ -12409,7 +12850,7 @@
               </p14:xfrm>
             </p:contentPart>
           </mc:Choice>
-          <mc:Fallback>
+          <mc:Fallback xmlns="">
             <p:pic>
               <p:nvPicPr>
                 <p:cNvPr id="25" name="Ink 24">
@@ -12440,8 +12881,8 @@
             </p:pic>
           </mc:Fallback>
         </mc:AlternateContent>
-        <mc:AlternateContent xmlns:mc="http://schemas.openxmlformats.org/markup-compatibility/2006">
-          <mc:Choice xmlns:p14="http://schemas.microsoft.com/office/powerpoint/2010/main" Requires="p14">
+        <mc:AlternateContent xmlns:mc="http://schemas.openxmlformats.org/markup-compatibility/2006" xmlns:p14="http://schemas.microsoft.com/office/powerpoint/2010/main">
+          <mc:Choice Requires="p14">
             <p:contentPart p14:bwMode="auto" r:id="rId27">
               <p14:nvContentPartPr>
                 <p14:cNvPr id="26" name="Ink 25">
@@ -12460,7 +12901,7 @@
               </p14:xfrm>
             </p:contentPart>
           </mc:Choice>
-          <mc:Fallback>
+          <mc:Fallback xmlns="">
             <p:pic>
               <p:nvPicPr>
                 <p:cNvPr id="26" name="Ink 25">
@@ -12577,8 +13018,8 @@
           </a:p>
         </p:txBody>
       </p:sp>
-      <mc:AlternateContent xmlns:mc="http://schemas.openxmlformats.org/markup-compatibility/2006">
-        <mc:Choice xmlns:p14="http://schemas.microsoft.com/office/powerpoint/2010/main" Requires="p14">
+      <mc:AlternateContent xmlns:mc="http://schemas.openxmlformats.org/markup-compatibility/2006" xmlns:p14="http://schemas.microsoft.com/office/powerpoint/2010/main">
+        <mc:Choice Requires="p14">
           <p:contentPart p14:bwMode="auto" r:id="rId29">
             <p14:nvContentPartPr>
               <p14:cNvPr id="31" name="Ink 30">
@@ -12597,7 +13038,7 @@
             </p14:xfrm>
           </p:contentPart>
         </mc:Choice>
-        <mc:Fallback>
+        <mc:Fallback xmlns="">
           <p:pic>
             <p:nvPicPr>
               <p:cNvPr id="31" name="Ink 30">
@@ -12697,7 +13138,7 @@
 </p:sld>
 </file>
 
-<file path=ppt/slides/slide23.xml><?xml version="1.0" encoding="utf-8"?>
+<file path=ppt/slides/slide24.xml><?xml version="1.0" encoding="utf-8"?>
 <p:sld xmlns:a="http://schemas.openxmlformats.org/drawingml/2006/main" xmlns:r="http://schemas.openxmlformats.org/officeDocument/2006/relationships" xmlns:p="http://schemas.openxmlformats.org/presentationml/2006/main">
   <p:cSld>
     <p:spTree>
@@ -12859,7 +13300,7 @@
           <p:nvPr/>
         </p:nvPicPr>
         <p:blipFill rotWithShape="1">
-          <a:blip r:embed="rId2">
+          <a:blip r:embed="rId3">
             <a:extLst>
               <a:ext uri="{28A0092B-C50C-407E-A947-70E740481C1C}">
                 <a14:useLocalDpi xmlns:a14="http://schemas.microsoft.com/office/drawing/2010/main" val="0"/>
@@ -12894,7 +13335,7 @@
           <p:nvPr/>
         </p:nvPicPr>
         <p:blipFill>
-          <a:blip r:embed="rId3">
+          <a:blip r:embed="rId4">
             <a:extLst>
               <a:ext uri="{28A0092B-C50C-407E-A947-70E740481C1C}">
                 <a14:useLocalDpi xmlns:a14="http://schemas.microsoft.com/office/drawing/2010/main" val="0"/>
@@ -12930,7 +13371,7 @@
           <p:nvPr/>
         </p:nvPicPr>
         <p:blipFill rotWithShape="1">
-          <a:blip r:embed="rId4">
+          <a:blip r:embed="rId5">
             <a:extLst>
               <a:ext uri="{28A0092B-C50C-407E-A947-70E740481C1C}">
                 <a14:useLocalDpi xmlns:a14="http://schemas.microsoft.com/office/drawing/2010/main" val="0"/>
@@ -12981,7 +13422,7 @@
             <a:pPr algn="ctr"/>
             <a:r>
               <a:rPr lang="en-US" dirty="0">
-                <a:hlinkClick r:id="rId5"/>
+                <a:hlinkClick r:id="rId6"/>
               </a:rPr>
               <a:t>https://github.com/WSU-Society-of-Computer-Developers/workshops/tree/main/react_nov28</a:t>
             </a:r>
@@ -12995,7 +13436,7 @@
             </a:r>
             <a:r>
               <a:rPr lang="en-US" dirty="0">
-                <a:hlinkClick r:id="rId6"/>
+                <a:hlinkClick r:id="rId7"/>
               </a:rPr>
               <a:t>https://s.zavaar.net/9uL9</a:t>
             </a:r>
@@ -13021,7 +13462,7 @@
           <p:nvPr/>
         </p:nvPicPr>
         <p:blipFill>
-          <a:blip r:embed="rId7">
+          <a:blip r:embed="rId8">
             <a:extLst>
               <a:ext uri="{28A0092B-C50C-407E-A947-70E740481C1C}">
                 <a14:useLocalDpi xmlns:a14="http://schemas.microsoft.com/office/drawing/2010/main" val="0"/>
@@ -14730,8 +15171,8 @@
           </a:prstGeom>
         </p:spPr>
       </p:pic>
-      <mc:AlternateContent xmlns:mc="http://schemas.openxmlformats.org/markup-compatibility/2006">
-        <mc:Choice xmlns:p14="http://schemas.microsoft.com/office/powerpoint/2010/main" Requires="p14">
+      <mc:AlternateContent xmlns:mc="http://schemas.openxmlformats.org/markup-compatibility/2006" xmlns:p14="http://schemas.microsoft.com/office/powerpoint/2010/main">
+        <mc:Choice Requires="p14">
           <p:contentPart p14:bwMode="auto" r:id="rId6">
             <p14:nvContentPartPr>
               <p14:cNvPr id="18" name="Ink 17">
@@ -14750,7 +15191,7 @@
             </p14:xfrm>
           </p:contentPart>
         </mc:Choice>
-        <mc:Fallback>
+        <mc:Fallback xmlns="">
           <p:pic>
             <p:nvPicPr>
               <p:cNvPr id="18" name="Ink 17">
@@ -14816,8 +15257,8 @@
           </a:p>
         </p:txBody>
       </p:sp>
-      <mc:AlternateContent xmlns:mc="http://schemas.openxmlformats.org/markup-compatibility/2006">
-        <mc:Choice xmlns:p14="http://schemas.microsoft.com/office/powerpoint/2010/main" Requires="p14">
+      <mc:AlternateContent xmlns:mc="http://schemas.openxmlformats.org/markup-compatibility/2006" xmlns:p14="http://schemas.microsoft.com/office/powerpoint/2010/main">
+        <mc:Choice Requires="p14">
           <p:contentPart p14:bwMode="auto" r:id="rId8">
             <p14:nvContentPartPr>
               <p14:cNvPr id="20" name="Ink 19">
@@ -14836,7 +15277,7 @@
             </p14:xfrm>
           </p:contentPart>
         </mc:Choice>
-        <mc:Fallback>
+        <mc:Fallback xmlns="">
           <p:pic>
             <p:nvPicPr>
               <p:cNvPr id="20" name="Ink 19">

</xml_diff>